<commit_message>
added demo #1 and html file
</commit_message>
<xml_diff>
--- a/Webscraping.pptx
+++ b/Webscraping.pptx
@@ -11,6 +11,7 @@
     <p:sldId id="261" r:id="rId5"/>
     <p:sldId id="260" r:id="rId6"/>
     <p:sldId id="259" r:id="rId7"/>
+    <p:sldId id="262" r:id="rId8"/>
   </p:sldIdLst>
   <p:sldSz cx="12192000" cy="6858000"/>
   <p:notesSz cx="6858000" cy="9144000"/>
@@ -109,6 +110,11 @@
       </a:defRPr>
     </a:lvl9pPr>
   </p:defaultTextStyle>
+  <p:extLst>
+    <p:ext uri="{EFAFB233-063F-42B5-8137-9DF3F51BA10A}">
+      <p15:sldGuideLst xmlns:p15="http://schemas.microsoft.com/office/powerpoint/2012/main"/>
+    </p:ext>
+  </p:extLst>
 </p:presentation>
 </file>
 
@@ -282,7 +288,7 @@
           <a:p>
             <a:fld id="{48A87A34-81AB-432B-8DAE-1953F412C126}" type="datetimeFigureOut">
               <a:rPr lang="en-US" dirty="0"/>
-              <a:t>2/13/17</a:t>
+              <a:t>2/14/17</a:t>
             </a:fld>
             <a:endParaRPr lang="en-US" dirty="0"/>
           </a:p>
@@ -544,7 +550,7 @@
           <a:p>
             <a:fld id="{48A87A34-81AB-432B-8DAE-1953F412C126}" type="datetimeFigureOut">
               <a:rPr lang="en-US" dirty="0"/>
-              <a:t>2/13/17</a:t>
+              <a:t>2/14/17</a:t>
             </a:fld>
             <a:endParaRPr lang="en-US" dirty="0"/>
           </a:p>
@@ -771,7 +777,7 @@
             <a:fld id="{48A87A34-81AB-432B-8DAE-1953F412C126}" type="datetimeFigureOut">
               <a:rPr lang="en-US" dirty="0"/>
               <a:pPr/>
-              <a:t>2/13/17</a:t>
+              <a:t>2/14/17</a:t>
             </a:fld>
             <a:endParaRPr lang="en-US" dirty="0"/>
           </a:p>
@@ -1077,7 +1083,7 @@
             <a:fld id="{48A87A34-81AB-432B-8DAE-1953F412C126}" type="datetimeFigureOut">
               <a:rPr lang="en-US" dirty="0"/>
               <a:pPr/>
-              <a:t>2/13/17</a:t>
+              <a:t>2/14/17</a:t>
             </a:fld>
             <a:endParaRPr lang="en-US" dirty="0"/>
           </a:p>
@@ -1546,7 +1552,7 @@
             <a:fld id="{48A87A34-81AB-432B-8DAE-1953F412C126}" type="datetimeFigureOut">
               <a:rPr lang="en-US" dirty="0"/>
               <a:pPr/>
-              <a:t>2/13/17</a:t>
+              <a:t>2/14/17</a:t>
             </a:fld>
             <a:endParaRPr lang="en-US" dirty="0"/>
           </a:p>
@@ -2088,7 +2094,7 @@
           <a:p>
             <a:fld id="{48A87A34-81AB-432B-8DAE-1953F412C126}" type="datetimeFigureOut">
               <a:rPr lang="en-US" dirty="0"/>
-              <a:t>2/13/17</a:t>
+              <a:t>2/14/17</a:t>
             </a:fld>
             <a:endParaRPr lang="en-US" dirty="0"/>
           </a:p>
@@ -2857,7 +2863,7 @@
           <a:p>
             <a:fld id="{48A87A34-81AB-432B-8DAE-1953F412C126}" type="datetimeFigureOut">
               <a:rPr lang="en-US" dirty="0"/>
-              <a:t>2/13/17</a:t>
+              <a:t>2/14/17</a:t>
             </a:fld>
             <a:endParaRPr lang="en-US" dirty="0"/>
           </a:p>
@@ -3027,7 +3033,7 @@
           <a:p>
             <a:fld id="{48A87A34-81AB-432B-8DAE-1953F412C126}" type="datetimeFigureOut">
               <a:rPr lang="en-US" dirty="0"/>
-              <a:t>2/13/17</a:t>
+              <a:t>2/14/17</a:t>
             </a:fld>
             <a:endParaRPr lang="en-US" dirty="0"/>
           </a:p>
@@ -3246,7 +3252,7 @@
             <a:fld id="{48A87A34-81AB-432B-8DAE-1953F412C126}" type="datetimeFigureOut">
               <a:rPr lang="en-US" dirty="0"/>
               <a:pPr/>
-              <a:t>2/13/17</a:t>
+              <a:t>2/14/17</a:t>
             </a:fld>
             <a:endParaRPr lang="en-US" dirty="0"/>
           </a:p>
@@ -3421,7 +3427,7 @@
           <a:p>
             <a:fld id="{48A87A34-81AB-432B-8DAE-1953F412C126}" type="datetimeFigureOut">
               <a:rPr lang="en-US" dirty="0"/>
-              <a:t>2/13/17</a:t>
+              <a:t>2/14/17</a:t>
             </a:fld>
             <a:endParaRPr lang="en-US" dirty="0"/>
           </a:p>
@@ -3706,7 +3712,7 @@
             <a:fld id="{48A87A34-81AB-432B-8DAE-1953F412C126}" type="datetimeFigureOut">
               <a:rPr lang="en-US" dirty="0"/>
               <a:pPr/>
-              <a:t>2/13/17</a:t>
+              <a:t>2/14/17</a:t>
             </a:fld>
             <a:endParaRPr lang="en-US" dirty="0"/>
           </a:p>
@@ -3943,7 +3949,7 @@
           <a:p>
             <a:fld id="{48A87A34-81AB-432B-8DAE-1953F412C126}" type="datetimeFigureOut">
               <a:rPr lang="en-US" dirty="0"/>
-              <a:t>2/13/17</a:t>
+              <a:t>2/14/17</a:t>
             </a:fld>
             <a:endParaRPr lang="en-US" dirty="0"/>
           </a:p>
@@ -4317,7 +4323,7 @@
           <a:p>
             <a:fld id="{48A87A34-81AB-432B-8DAE-1953F412C126}" type="datetimeFigureOut">
               <a:rPr lang="en-US" dirty="0"/>
-              <a:t>2/13/17</a:t>
+              <a:t>2/14/17</a:t>
             </a:fld>
             <a:endParaRPr lang="en-US" dirty="0"/>
           </a:p>
@@ -4430,7 +4436,7 @@
           <a:p>
             <a:fld id="{48A87A34-81AB-432B-8DAE-1953F412C126}" type="datetimeFigureOut">
               <a:rPr lang="en-US" dirty="0"/>
-              <a:t>2/13/17</a:t>
+              <a:t>2/14/17</a:t>
             </a:fld>
             <a:endParaRPr lang="en-US" dirty="0"/>
           </a:p>
@@ -4520,7 +4526,7 @@
           <a:p>
             <a:fld id="{48A87A34-81AB-432B-8DAE-1953F412C126}" type="datetimeFigureOut">
               <a:rPr lang="en-US" dirty="0"/>
-              <a:t>2/13/17</a:t>
+              <a:t>2/14/17</a:t>
             </a:fld>
             <a:endParaRPr lang="en-US" dirty="0"/>
           </a:p>
@@ -4764,7 +4770,7 @@
           <a:p>
             <a:fld id="{48A87A34-81AB-432B-8DAE-1953F412C126}" type="datetimeFigureOut">
               <a:rPr lang="en-US" dirty="0"/>
-              <a:t>2/13/17</a:t>
+              <a:t>2/14/17</a:t>
             </a:fld>
             <a:endParaRPr lang="en-US" dirty="0"/>
           </a:p>
@@ -5016,7 +5022,7 @@
           <a:p>
             <a:fld id="{48A87A34-81AB-432B-8DAE-1953F412C126}" type="datetimeFigureOut">
               <a:rPr lang="en-US" dirty="0"/>
-              <a:t>2/13/17</a:t>
+              <a:t>2/14/17</a:t>
             </a:fld>
             <a:endParaRPr lang="en-US" dirty="0"/>
           </a:p>
@@ -5255,7 +5261,7 @@
             <a:fld id="{48A87A34-81AB-432B-8DAE-1953F412C126}" type="datetimeFigureOut">
               <a:rPr lang="en-US" dirty="0"/>
               <a:pPr/>
-              <a:t>2/13/17</a:t>
+              <a:t>2/14/17</a:t>
             </a:fld>
             <a:endParaRPr lang="en-US" dirty="0"/>
           </a:p>
@@ -5678,12 +5684,8 @@
           <a:lstStyle/>
           <a:p>
             <a:r>
-              <a:rPr lang="en-US" dirty="0" err="1" smtClean="0"/>
-              <a:t>WebScraping</a:t>
-            </a:r>
-            <a:r>
               <a:rPr lang="en-US" dirty="0" smtClean="0"/>
-              <a:t> in Python</a:t>
+              <a:t>Web Scraping in Python</a:t>
             </a:r>
             <a:endParaRPr lang="en-US" dirty="0"/>
           </a:p>
@@ -5766,15 +5768,7 @@
           <a:p>
             <a:r>
               <a:rPr lang="en-US" dirty="0" smtClean="0"/>
-              <a:t>What is </a:t>
-            </a:r>
-            <a:r>
-              <a:rPr lang="en-US" dirty="0" err="1" smtClean="0"/>
-              <a:t>webscraping</a:t>
-            </a:r>
-            <a:r>
-              <a:rPr lang="en-US" dirty="0" smtClean="0"/>
-              <a:t>?</a:t>
+              <a:t>What is web scraping?</a:t>
             </a:r>
             <a:endParaRPr lang="en-US" dirty="0"/>
           </a:p>
@@ -5792,10 +5786,31 @@
         </p:nvSpPr>
         <p:spPr/>
         <p:txBody>
-          <a:bodyPr/>
-          <a:lstStyle/>
-          <a:p>
-            <a:endParaRPr lang="en-US"/>
+          <a:bodyPr>
+            <a:normAutofit/>
+          </a:bodyPr>
+          <a:lstStyle/>
+          <a:p>
+            <a:r>
+              <a:rPr lang="en-US" sz="3600" dirty="0" smtClean="0"/>
+              <a:t>The process of extracting data from websites</a:t>
+            </a:r>
+          </a:p>
+          <a:p>
+            <a:r>
+              <a:rPr lang="en-US" sz="3600" dirty="0" smtClean="0"/>
+              <a:t>HTML to Structured Data</a:t>
+            </a:r>
+          </a:p>
+          <a:p>
+            <a:r>
+              <a:rPr lang="en-US" sz="3600" dirty="0" smtClean="0"/>
+              <a:t>Useful for collecting mass amounts of data</a:t>
+            </a:r>
+            <a:endParaRPr lang="en-US" sz="3600" dirty="0" smtClean="0"/>
+          </a:p>
+          <a:p>
+            <a:endParaRPr lang="en-US" sz="3600" dirty="0"/>
           </a:p>
         </p:txBody>
       </p:sp>
@@ -5874,7 +5889,17 @@
           <a:bodyPr/>
           <a:lstStyle/>
           <a:p>
-            <a:endParaRPr lang="en-US"/>
+            <a:r>
+              <a:rPr lang="en-US" smtClean="0"/>
+              <a:t>Module for </a:t>
+            </a:r>
+            <a:r>
+              <a:rPr lang="en-US" dirty="0" smtClean="0"/>
+              <a:t>pulling data from HTML and XML files</a:t>
+            </a:r>
+          </a:p>
+          <a:p>
+            <a:endParaRPr lang="en-US" dirty="0"/>
           </a:p>
         </p:txBody>
       </p:sp>
@@ -5932,7 +5957,7 @@
           <a:p>
             <a:r>
               <a:rPr lang="en-US" dirty="0" smtClean="0"/>
-              <a:t>Install Python</a:t>
+              <a:t>Modules Used</a:t>
             </a:r>
             <a:endParaRPr lang="en-US" dirty="0"/>
           </a:p>
@@ -5950,27 +5975,133 @@
         </p:nvSpPr>
         <p:spPr/>
         <p:txBody>
-          <a:bodyPr/>
-          <a:lstStyle/>
-          <a:p>
-            <a:pPr marL="0" marR="0" lvl="0" indent="0" defTabSz="914400" eaLnBrk="1" fontAlgn="auto" latinLnBrk="0" hangingPunct="1">
+          <a:bodyPr>
+            <a:normAutofit/>
+          </a:bodyPr>
+          <a:lstStyle/>
+          <a:p>
+            <a:pPr>
               <a:lnSpc>
                 <a:spcPct val="100000"/>
               </a:lnSpc>
               <a:spcBef>
                 <a:spcPts val="0"/>
               </a:spcBef>
-              <a:spcAft>
-                <a:spcPts val="0"/>
-              </a:spcAft>
-              <a:buClrTx/>
-              <a:buSzTx/>
-              <a:buFontTx/>
-              <a:buNone/>
-              <a:tabLst/>
               <a:defRPr/>
             </a:pPr>
-            <a:endParaRPr lang="en-US" dirty="0" smtClean="0"/>
+            <a:r>
+              <a:rPr lang="en-US" sz="3600" dirty="0" smtClean="0"/>
+              <a:t>If you don</a:t>
+            </a:r>
+            <a:r>
+              <a:rPr lang="mr-IN" sz="3600" dirty="0" smtClean="0"/>
+              <a:t>’</a:t>
+            </a:r>
+            <a:r>
+              <a:rPr lang="en-US" sz="3600" dirty="0" smtClean="0"/>
+              <a:t>t have Python installed</a:t>
+            </a:r>
+          </a:p>
+          <a:p>
+            <a:pPr lvl="1">
+              <a:lnSpc>
+                <a:spcPct val="100000"/>
+              </a:lnSpc>
+              <a:spcBef>
+                <a:spcPts val="0"/>
+              </a:spcBef>
+              <a:defRPr/>
+            </a:pPr>
+            <a:r>
+              <a:rPr lang="en-US" sz="3600" dirty="0">
+                <a:hlinkClick r:id="rId2"/>
+              </a:rPr>
+              <a:t>https://www.python.org/downloads</a:t>
+            </a:r>
+            <a:r>
+              <a:rPr lang="en-US" sz="3600" dirty="0" smtClean="0">
+                <a:hlinkClick r:id="rId2"/>
+              </a:rPr>
+              <a:t>/</a:t>
+            </a:r>
+            <a:endParaRPr lang="en-US" sz="3600" dirty="0" smtClean="0"/>
+          </a:p>
+          <a:p>
+            <a:pPr lvl="1">
+              <a:lnSpc>
+                <a:spcPct val="100000"/>
+              </a:lnSpc>
+              <a:spcBef>
+                <a:spcPts val="0"/>
+              </a:spcBef>
+              <a:defRPr/>
+            </a:pPr>
+            <a:r>
+              <a:rPr lang="en-US" sz="3600" dirty="0" smtClean="0"/>
+              <a:t>Python 3.6</a:t>
+            </a:r>
+          </a:p>
+          <a:p>
+            <a:pPr>
+              <a:lnSpc>
+                <a:spcPct val="100000"/>
+              </a:lnSpc>
+              <a:spcBef>
+                <a:spcPts val="0"/>
+              </a:spcBef>
+              <a:defRPr/>
+            </a:pPr>
+            <a:r>
+              <a:rPr lang="en-US" sz="3600" dirty="0" smtClean="0"/>
+              <a:t>Beautiful Soup</a:t>
+            </a:r>
+          </a:p>
+          <a:p>
+            <a:pPr lvl="1">
+              <a:lnSpc>
+                <a:spcPct val="100000"/>
+              </a:lnSpc>
+              <a:spcBef>
+                <a:spcPts val="0"/>
+              </a:spcBef>
+              <a:defRPr/>
+            </a:pPr>
+            <a:r>
+              <a:rPr lang="en-US" sz="3600" dirty="0" smtClean="0"/>
+              <a:t>pip install beautifulsoup4</a:t>
+            </a:r>
+            <a:endParaRPr lang="en-US" sz="3600" dirty="0"/>
+          </a:p>
+          <a:p>
+            <a:pPr>
+              <a:lnSpc>
+                <a:spcPct val="100000"/>
+              </a:lnSpc>
+              <a:spcBef>
+                <a:spcPts val="0"/>
+              </a:spcBef>
+              <a:defRPr/>
+            </a:pPr>
+            <a:r>
+              <a:rPr lang="en-US" sz="3600" dirty="0" err="1" smtClean="0"/>
+              <a:t>Urllib</a:t>
+            </a:r>
+            <a:endParaRPr lang="en-US" sz="3600" dirty="0" smtClean="0"/>
+          </a:p>
+          <a:p>
+            <a:pPr lvl="1">
+              <a:lnSpc>
+                <a:spcPct val="100000"/>
+              </a:lnSpc>
+              <a:spcBef>
+                <a:spcPts val="0"/>
+              </a:spcBef>
+              <a:defRPr/>
+            </a:pPr>
+            <a:r>
+              <a:rPr lang="en-US" sz="3600" dirty="0" smtClean="0"/>
+              <a:t>Comes with Python</a:t>
+            </a:r>
           </a:p>
         </p:txBody>
       </p:sp>
@@ -6046,10 +6177,40 @@
         </p:nvSpPr>
         <p:spPr/>
         <p:txBody>
-          <a:bodyPr/>
-          <a:lstStyle/>
-          <a:p>
-            <a:endParaRPr lang="en-US"/>
+          <a:bodyPr>
+            <a:normAutofit/>
+          </a:bodyPr>
+          <a:lstStyle/>
+          <a:p>
+            <a:r>
+              <a:rPr lang="en-US" sz="3600" dirty="0" smtClean="0"/>
+              <a:t>Web Page with valuable data</a:t>
+            </a:r>
+          </a:p>
+          <a:p>
+            <a:r>
+              <a:rPr lang="en-US" sz="3600" dirty="0" smtClean="0"/>
+              <a:t>You want to automatically generate a graphical analysis of this data</a:t>
+            </a:r>
+          </a:p>
+          <a:p>
+            <a:r>
+              <a:rPr lang="en-US" sz="3600" dirty="0" smtClean="0"/>
+              <a:t>Go to </a:t>
+            </a:r>
+            <a:r>
+              <a:rPr lang="en-US" sz="3600" dirty="0">
+                <a:hlinkClick r:id="rId2"/>
+              </a:rPr>
+              <a:t>https://www.jlawrence.co/ws</a:t>
+            </a:r>
+            <a:endParaRPr lang="en-US" sz="3600" dirty="0"/>
+          </a:p>
+          <a:p>
+            <a:endParaRPr lang="en-US" sz="3600" dirty="0" smtClean="0"/>
+          </a:p>
+          <a:p>
+            <a:endParaRPr lang="en-US" sz="3600" dirty="0"/>
           </a:p>
         </p:txBody>
       </p:sp>
@@ -6107,11 +6268,7 @@
           <a:p>
             <a:r>
               <a:rPr lang="en-US" dirty="0" smtClean="0"/>
-              <a:t>Applications of </a:t>
-            </a:r>
-            <a:r>
-              <a:rPr lang="en-US" dirty="0" err="1" smtClean="0"/>
-              <a:t>webscraping</a:t>
+              <a:t>Applications of web scraping</a:t>
             </a:r>
             <a:endParaRPr lang="en-US" dirty="0"/>
           </a:p>
@@ -6129,10 +6286,42 @@
         </p:nvSpPr>
         <p:spPr/>
         <p:txBody>
-          <a:bodyPr/>
-          <a:lstStyle/>
-          <a:p>
-            <a:endParaRPr lang="en-US" dirty="0"/>
+          <a:bodyPr>
+            <a:normAutofit/>
+          </a:bodyPr>
+          <a:lstStyle/>
+          <a:p>
+            <a:r>
+              <a:rPr lang="en-US" sz="3600" dirty="0" smtClean="0"/>
+              <a:t>Social Network Profiles</a:t>
+            </a:r>
+          </a:p>
+          <a:p>
+            <a:r>
+              <a:rPr lang="en-US" sz="3600" dirty="0" smtClean="0"/>
+              <a:t>Marketing Leads</a:t>
+            </a:r>
+          </a:p>
+          <a:p>
+            <a:r>
+              <a:rPr lang="en-US" sz="3600" dirty="0" smtClean="0"/>
+              <a:t>Scrape Reviews of Products/Hotels</a:t>
+            </a:r>
+          </a:p>
+          <a:p>
+            <a:r>
+              <a:rPr lang="en-US" sz="3600" dirty="0" smtClean="0"/>
+              <a:t>Gather contact details</a:t>
+            </a:r>
+          </a:p>
+          <a:p>
+            <a:endParaRPr lang="en-US" sz="3600" dirty="0" smtClean="0"/>
+          </a:p>
+          <a:p>
+            <a:endParaRPr lang="en-US" sz="3600" dirty="0" smtClean="0"/>
+          </a:p>
+          <a:p>
+            <a:endParaRPr lang="en-US" sz="3600" dirty="0"/>
           </a:p>
         </p:txBody>
       </p:sp>
@@ -6153,6 +6342,172 @@
       </p:par>
     </p:tnLst>
   </p:timing>
+</p:sld>
+</file>
+
+<file path=ppt/slides/slide7.xml><?xml version="1.0" encoding="utf-8"?>
+<p:sld xmlns:a="http://schemas.openxmlformats.org/drawingml/2006/main" xmlns:r="http://schemas.openxmlformats.org/officeDocument/2006/relationships" xmlns:p="http://schemas.openxmlformats.org/presentationml/2006/main">
+  <p:cSld>
+    <p:spTree>
+      <p:nvGrpSpPr>
+        <p:cNvPr id="1" name=""/>
+        <p:cNvGrpSpPr/>
+        <p:nvPr/>
+      </p:nvGrpSpPr>
+      <p:grpSpPr>
+        <a:xfrm>
+          <a:off x="0" y="0"/>
+          <a:ext cx="0" cy="0"/>
+          <a:chOff x="0" y="0"/>
+          <a:chExt cx="0" cy="0"/>
+        </a:xfrm>
+      </p:grpSpPr>
+      <p:sp>
+        <p:nvSpPr>
+          <p:cNvPr id="2" name="Title 1"/>
+          <p:cNvSpPr>
+            <a:spLocks noGrp="1"/>
+          </p:cNvSpPr>
+          <p:nvPr>
+            <p:ph type="title"/>
+          </p:nvPr>
+        </p:nvSpPr>
+        <p:spPr/>
+        <p:txBody>
+          <a:bodyPr/>
+          <a:lstStyle/>
+          <a:p>
+            <a:r>
+              <a:rPr lang="en-US" dirty="0" smtClean="0"/>
+              <a:t>Learn more</a:t>
+            </a:r>
+            <a:endParaRPr lang="en-US" dirty="0"/>
+          </a:p>
+        </p:txBody>
+      </p:sp>
+      <p:sp>
+        <p:nvSpPr>
+          <p:cNvPr id="3" name="Content Placeholder 2"/>
+          <p:cNvSpPr>
+            <a:spLocks noGrp="1"/>
+          </p:cNvSpPr>
+          <p:nvPr>
+            <p:ph idx="1"/>
+          </p:nvPr>
+        </p:nvSpPr>
+        <p:spPr/>
+        <p:txBody>
+          <a:bodyPr>
+            <a:noAutofit/>
+          </a:bodyPr>
+          <a:lstStyle/>
+          <a:p>
+            <a:r>
+              <a:rPr lang="en-US" sz="2400" dirty="0" smtClean="0"/>
+              <a:t>University of Michigan</a:t>
+            </a:r>
+          </a:p>
+          <a:p>
+            <a:pPr lvl="1"/>
+            <a:r>
+              <a:rPr lang="en-US" sz="2400" dirty="0">
+                <a:hlinkClick r:id="rId2"/>
+              </a:rPr>
+              <a:t>https://</a:t>
+            </a:r>
+            <a:r>
+              <a:rPr lang="en-US" sz="2400" dirty="0" smtClean="0">
+                <a:hlinkClick r:id="rId2"/>
+              </a:rPr>
+              <a:t>www.coursera.org/learn/python-network-data</a:t>
+            </a:r>
+            <a:endParaRPr lang="en-US" sz="2400" dirty="0" smtClean="0"/>
+          </a:p>
+          <a:p>
+            <a:r>
+              <a:rPr lang="en-US" sz="2400" dirty="0" smtClean="0"/>
+              <a:t>Beautiful Soup Documentation</a:t>
+            </a:r>
+          </a:p>
+          <a:p>
+            <a:pPr lvl="1"/>
+            <a:r>
+              <a:rPr lang="en-US" sz="2400" dirty="0">
+                <a:hlinkClick r:id="rId3"/>
+              </a:rPr>
+              <a:t>https://www.crummy.com/software/BeautifulSoup/bs4/doc</a:t>
+            </a:r>
+            <a:r>
+              <a:rPr lang="en-US" sz="2400" dirty="0" smtClean="0">
+                <a:hlinkClick r:id="rId3"/>
+              </a:rPr>
+              <a:t>/</a:t>
+            </a:r>
+            <a:endParaRPr lang="en-US" sz="2400" dirty="0" smtClean="0"/>
+          </a:p>
+          <a:p>
+            <a:r>
+              <a:rPr lang="en-US" sz="2400" dirty="0" smtClean="0"/>
+              <a:t>Temple University CIS 3715 </a:t>
+            </a:r>
+            <a:r>
+              <a:rPr lang="mr-IN" sz="2400" dirty="0" smtClean="0"/>
+              <a:t>–</a:t>
+            </a:r>
+            <a:r>
+              <a:rPr lang="en-US" sz="2400" dirty="0" smtClean="0"/>
+              <a:t> Principles of Data Science</a:t>
+            </a:r>
+          </a:p>
+          <a:p>
+            <a:r>
+              <a:rPr lang="en-US" sz="2400" dirty="0" smtClean="0"/>
+              <a:t>Web Scraping with Python: Collecting Data from the Modern Web, 1</a:t>
+            </a:r>
+            <a:r>
+              <a:rPr lang="en-US" sz="2400" baseline="30000" dirty="0" smtClean="0"/>
+              <a:t>st</a:t>
+            </a:r>
+            <a:r>
+              <a:rPr lang="en-US" sz="2400" dirty="0" smtClean="0"/>
+              <a:t> Ed.</a:t>
+            </a:r>
+          </a:p>
+          <a:p>
+            <a:pPr lvl="1"/>
+            <a:r>
+              <a:rPr lang="en-US" sz="2400" dirty="0"/>
+              <a:t> </a:t>
+            </a:r>
+            <a:r>
+              <a:rPr lang="en-US" sz="2400" dirty="0">
+                <a:hlinkClick r:id="rId4"/>
+              </a:rPr>
+              <a:t>http://</a:t>
+            </a:r>
+            <a:r>
+              <a:rPr lang="en-US" sz="2400" dirty="0" smtClean="0">
+                <a:hlinkClick r:id="rId4"/>
+              </a:rPr>
+              <a:t>amzn.to/2l5W2pS</a:t>
+            </a:r>
+          </a:p>
+          <a:p>
+            <a:pPr lvl="1"/>
+            <a:endParaRPr lang="en-US" sz="2400" dirty="0" smtClean="0"/>
+          </a:p>
+        </p:txBody>
+      </p:sp>
+    </p:spTree>
+    <p:extLst>
+      <p:ext uri="{BB962C8B-B14F-4D97-AF65-F5344CB8AC3E}">
+        <p14:creationId xmlns:p14="http://schemas.microsoft.com/office/powerpoint/2010/main" val="90621452"/>
+      </p:ext>
+    </p:extLst>
+  </p:cSld>
+  <p:clrMapOvr>
+    <a:masterClrMapping/>
+  </p:clrMapOvr>
 </p:sld>
 </file>
 

</xml_diff>

<commit_message>
minor changes to the powerpoint
</commit_message>
<xml_diff>
--- a/Webscraping.pptx
+++ b/Webscraping.pptx
@@ -10,8 +10,10 @@
     <p:sldId id="258" r:id="rId4"/>
     <p:sldId id="261" r:id="rId5"/>
     <p:sldId id="260" r:id="rId6"/>
-    <p:sldId id="259" r:id="rId7"/>
-    <p:sldId id="262" r:id="rId8"/>
+    <p:sldId id="263" r:id="rId7"/>
+    <p:sldId id="259" r:id="rId8"/>
+    <p:sldId id="262" r:id="rId9"/>
+    <p:sldId id="264" r:id="rId10"/>
   </p:sldIdLst>
   <p:sldSz cx="12192000" cy="6858000"/>
   <p:notesSz cx="6858000" cy="9144000"/>
@@ -5890,19 +5892,7 @@
           <a:p>
             <a:r>
               <a:rPr lang="en-US" sz="3600" dirty="0" smtClean="0"/>
-              <a:t>Python l</a:t>
-            </a:r>
-            <a:r>
-              <a:rPr lang="en-US" sz="3600" dirty="0" smtClean="0"/>
-              <a:t>ibrary for </a:t>
-            </a:r>
-            <a:r>
-              <a:rPr lang="en-US" sz="3600" dirty="0" smtClean="0"/>
-              <a:t>pulling data from HTML and XML </a:t>
-            </a:r>
-            <a:r>
-              <a:rPr lang="en-US" sz="3600" dirty="0" smtClean="0"/>
-              <a:t>files</a:t>
+              <a:t>Python library for pulling data from HTML and XML files</a:t>
             </a:r>
           </a:p>
           <a:p>
@@ -5938,7 +5928,6 @@
               <a:rPr lang="en-US" sz="3600" dirty="0" smtClean="0"/>
               <a:t>”</a:t>
             </a:r>
-            <a:endParaRPr lang="en-US" sz="3600" dirty="0" smtClean="0"/>
           </a:p>
           <a:p>
             <a:endParaRPr lang="en-US" dirty="0"/>
@@ -5999,11 +5988,7 @@
           <a:p>
             <a:r>
               <a:rPr lang="en-US" dirty="0" smtClean="0"/>
-              <a:t>Libraries </a:t>
-            </a:r>
-            <a:r>
-              <a:rPr lang="en-US" dirty="0" smtClean="0"/>
-              <a:t>Used</a:t>
+              <a:t>Libraries Used</a:t>
             </a:r>
             <a:endParaRPr lang="en-US" dirty="0"/>
           </a:p>
@@ -6088,7 +6073,11 @@
             </a:r>
             <a:r>
               <a:rPr lang="en-US" sz="3600" dirty="0" smtClean="0"/>
-              <a:t>Soup 4</a:t>
+              <a:t>Soup </a:t>
+            </a:r>
+            <a:r>
+              <a:rPr lang="en-US" sz="3600" dirty="0" smtClean="0"/>
+              <a:t>4</a:t>
             </a:r>
             <a:endParaRPr lang="en-US" sz="3600" dirty="0"/>
           </a:p>
@@ -6103,24 +6092,8 @@
               <a:defRPr/>
             </a:pPr>
             <a:r>
-              <a:rPr lang="en-US" sz="3600" dirty="0" err="1" smtClean="0"/>
+              <a:rPr lang="en-US" sz="3600" smtClean="0"/>
               <a:t>Urllib</a:t>
-            </a:r>
-            <a:endParaRPr lang="en-US" sz="3600" dirty="0" smtClean="0"/>
-          </a:p>
-          <a:p>
-            <a:pPr>
-              <a:lnSpc>
-                <a:spcPct val="100000"/>
-              </a:lnSpc>
-              <a:spcBef>
-                <a:spcPts val="0"/>
-              </a:spcBef>
-              <a:defRPr/>
-            </a:pPr>
-            <a:r>
-              <a:rPr lang="en-US" sz="3600" dirty="0" err="1" smtClean="0"/>
-              <a:t>Matplotlib</a:t>
             </a:r>
             <a:endParaRPr lang="en-US" sz="3600" dirty="0" smtClean="0"/>
           </a:p>
@@ -6289,6 +6262,105 @@
           <a:p>
             <a:r>
               <a:rPr lang="en-US" dirty="0" smtClean="0"/>
+              <a:t>More Advanced Example</a:t>
+            </a:r>
+            <a:endParaRPr lang="en-US" dirty="0"/>
+          </a:p>
+        </p:txBody>
+      </p:sp>
+      <p:sp>
+        <p:nvSpPr>
+          <p:cNvPr id="3" name="Content Placeholder 2"/>
+          <p:cNvSpPr>
+            <a:spLocks noGrp="1"/>
+          </p:cNvSpPr>
+          <p:nvPr>
+            <p:ph idx="1"/>
+          </p:nvPr>
+        </p:nvSpPr>
+        <p:spPr/>
+        <p:txBody>
+          <a:bodyPr>
+            <a:normAutofit/>
+          </a:bodyPr>
+          <a:lstStyle/>
+          <a:p>
+            <a:r>
+              <a:rPr lang="en-US" sz="3600" dirty="0" smtClean="0"/>
+              <a:t>You want to keep up to date with a blog but it doesn’t have an updates feature</a:t>
+            </a:r>
+          </a:p>
+          <a:p>
+            <a:r>
+              <a:rPr lang="en-US" sz="3600" dirty="0" smtClean="0"/>
+              <a:t>You want to be notified via email whenever something new is posted</a:t>
+            </a:r>
+          </a:p>
+          <a:p>
+            <a:r>
+              <a:rPr lang="en-US" sz="3600" dirty="0" smtClean="0"/>
+              <a:t>Go to: </a:t>
+            </a:r>
+            <a:r>
+              <a:rPr lang="en-US" sz="3600" dirty="0" smtClean="0">
+                <a:hlinkClick r:id="rId2"/>
+              </a:rPr>
+              <a:t>http://www.jlawrence.co/tb</a:t>
+            </a:r>
+            <a:endParaRPr lang="en-US" sz="3600" dirty="0" smtClean="0"/>
+          </a:p>
+          <a:p>
+            <a:endParaRPr lang="en-US" sz="3600" dirty="0"/>
+          </a:p>
+        </p:txBody>
+      </p:sp>
+    </p:spTree>
+    <p:extLst>
+      <p:ext uri="{BB962C8B-B14F-4D97-AF65-F5344CB8AC3E}">
+        <p14:creationId xmlns:p14="http://schemas.microsoft.com/office/powerpoint/2010/main" val="2014681064"/>
+      </p:ext>
+    </p:extLst>
+  </p:cSld>
+  <p:clrMapOvr>
+    <a:masterClrMapping/>
+  </p:clrMapOvr>
+</p:sld>
+</file>
+
+<file path=ppt/slides/slide7.xml><?xml version="1.0" encoding="utf-8"?>
+<p:sld xmlns:a="http://schemas.openxmlformats.org/drawingml/2006/main" xmlns:r="http://schemas.openxmlformats.org/officeDocument/2006/relationships" xmlns:p="http://schemas.openxmlformats.org/presentationml/2006/main">
+  <p:cSld>
+    <p:spTree>
+      <p:nvGrpSpPr>
+        <p:cNvPr id="1" name=""/>
+        <p:cNvGrpSpPr/>
+        <p:nvPr/>
+      </p:nvGrpSpPr>
+      <p:grpSpPr>
+        <a:xfrm>
+          <a:off x="0" y="0"/>
+          <a:ext cx="0" cy="0"/>
+          <a:chOff x="0" y="0"/>
+          <a:chExt cx="0" cy="0"/>
+        </a:xfrm>
+      </p:grpSpPr>
+      <p:sp>
+        <p:nvSpPr>
+          <p:cNvPr id="2" name="Title 1"/>
+          <p:cNvSpPr>
+            <a:spLocks noGrp="1"/>
+          </p:cNvSpPr>
+          <p:nvPr>
+            <p:ph type="title"/>
+          </p:nvPr>
+        </p:nvSpPr>
+        <p:spPr/>
+        <p:txBody>
+          <a:bodyPr/>
+          <a:lstStyle/>
+          <a:p>
+            <a:r>
+              <a:rPr lang="en-US" dirty="0" smtClean="0"/>
               <a:t>Applications of web scraping</a:t>
             </a:r>
             <a:endParaRPr lang="en-US" dirty="0"/>
@@ -6366,7 +6438,7 @@
 </p:sld>
 </file>
 
-<file path=ppt/slides/slide7.xml><?xml version="1.0" encoding="utf-8"?>
+<file path=ppt/slides/slide8.xml><?xml version="1.0" encoding="utf-8"?>
 <p:sld xmlns:a="http://schemas.openxmlformats.org/drawingml/2006/main" xmlns:r="http://schemas.openxmlformats.org/officeDocument/2006/relationships" xmlns:p="http://schemas.openxmlformats.org/presentationml/2006/main">
   <p:cSld>
     <p:spTree>
@@ -6523,6 +6595,89 @@
     <p:extLst>
       <p:ext uri="{BB962C8B-B14F-4D97-AF65-F5344CB8AC3E}">
         <p14:creationId xmlns:p14="http://schemas.microsoft.com/office/powerpoint/2010/main" val="90621452"/>
+      </p:ext>
+    </p:extLst>
+  </p:cSld>
+  <p:clrMapOvr>
+    <a:masterClrMapping/>
+  </p:clrMapOvr>
+</p:sld>
+</file>
+
+<file path=ppt/slides/slide9.xml><?xml version="1.0" encoding="utf-8"?>
+<p:sld xmlns:a="http://schemas.openxmlformats.org/drawingml/2006/main" xmlns:r="http://schemas.openxmlformats.org/officeDocument/2006/relationships" xmlns:p="http://schemas.openxmlformats.org/presentationml/2006/main">
+  <p:cSld>
+    <p:spTree>
+      <p:nvGrpSpPr>
+        <p:cNvPr id="1" name=""/>
+        <p:cNvGrpSpPr/>
+        <p:nvPr/>
+      </p:nvGrpSpPr>
+      <p:grpSpPr>
+        <a:xfrm>
+          <a:off x="0" y="0"/>
+          <a:ext cx="0" cy="0"/>
+          <a:chOff x="0" y="0"/>
+          <a:chExt cx="0" cy="0"/>
+        </a:xfrm>
+      </p:grpSpPr>
+      <p:sp>
+        <p:nvSpPr>
+          <p:cNvPr id="2" name="Title 1"/>
+          <p:cNvSpPr>
+            <a:spLocks noGrp="1"/>
+          </p:cNvSpPr>
+          <p:nvPr>
+            <p:ph type="title"/>
+          </p:nvPr>
+        </p:nvSpPr>
+        <p:spPr/>
+        <p:txBody>
+          <a:bodyPr/>
+          <a:lstStyle/>
+          <a:p>
+            <a:r>
+              <a:rPr lang="en-US" dirty="0" smtClean="0"/>
+              <a:t>Materials Used</a:t>
+            </a:r>
+            <a:endParaRPr lang="en-US" dirty="0"/>
+          </a:p>
+        </p:txBody>
+      </p:sp>
+      <p:sp>
+        <p:nvSpPr>
+          <p:cNvPr id="3" name="Content Placeholder 2"/>
+          <p:cNvSpPr>
+            <a:spLocks noGrp="1"/>
+          </p:cNvSpPr>
+          <p:nvPr>
+            <p:ph idx="1"/>
+          </p:nvPr>
+        </p:nvSpPr>
+        <p:spPr/>
+        <p:txBody>
+          <a:bodyPr>
+            <a:normAutofit/>
+          </a:bodyPr>
+          <a:lstStyle/>
+          <a:p>
+            <a:r>
+              <a:rPr lang="en-US" sz="3600" dirty="0" smtClean="0">
+                <a:hlinkClick r:id="rId2"/>
+              </a:rPr>
+              <a:t>https://www.github.com/lawja/webscraping_ws</a:t>
+            </a:r>
+            <a:endParaRPr lang="en-US" sz="3600" dirty="0" smtClean="0"/>
+          </a:p>
+          <a:p>
+            <a:endParaRPr lang="en-US" sz="3600" dirty="0"/>
+          </a:p>
+        </p:txBody>
+      </p:sp>
+    </p:spTree>
+    <p:extLst>
+      <p:ext uri="{BB962C8B-B14F-4D97-AF65-F5344CB8AC3E}">
+        <p14:creationId xmlns:p14="http://schemas.microsoft.com/office/powerpoint/2010/main" val="639712739"/>
       </p:ext>
     </p:extLst>
   </p:cSld>

</xml_diff>